<commit_message>
added 540 hw1 2 solution
</commit_message>
<xml_diff>
--- a/534_ANN/assignments fall 2016.pptx
+++ b/534_ANN/assignments fall 2016.pptx
@@ -5,13 +5,14 @@
     <p:sldMasterId id="2147483648" r:id="rId1"/>
   </p:sldMasterIdLst>
   <p:notesMasterIdLst>
-    <p:notesMasterId r:id="rId6"/>
+    <p:notesMasterId r:id="rId7"/>
   </p:notesMasterIdLst>
   <p:sldIdLst>
     <p:sldId id="257" r:id="rId2"/>
     <p:sldId id="258" r:id="rId3"/>
     <p:sldId id="259" r:id="rId4"/>
     <p:sldId id="260" r:id="rId5"/>
+    <p:sldId id="261" r:id="rId6"/>
   </p:sldIdLst>
   <p:sldSz cx="12192000" cy="6858000"/>
   <p:notesSz cx="6858000" cy="9144000"/>
@@ -200,7 +201,7 @@
           <a:p>
             <a:fld id="{12E258BF-62B2-4ACA-82C2-31AD9C5FBADA}" type="datetimeFigureOut">
               <a:rPr lang="en-US" smtClean="0"/>
-              <a:t>10/6/2016</a:t>
+              <a:t>10/18/2016</a:t>
             </a:fld>
             <a:endParaRPr lang="en-US"/>
           </a:p>
@@ -599,7 +600,7 @@
           <a:p>
             <a:fld id="{4C9CA330-40D8-4D0D-94EB-671FCF1C0FE4}" type="datetimeFigureOut">
               <a:rPr lang="en-US" smtClean="0"/>
-              <a:t>10/6/2016</a:t>
+              <a:t>10/18/2016</a:t>
             </a:fld>
             <a:endParaRPr lang="en-US"/>
           </a:p>
@@ -769,7 +770,7 @@
           <a:p>
             <a:fld id="{4C9CA330-40D8-4D0D-94EB-671FCF1C0FE4}" type="datetimeFigureOut">
               <a:rPr lang="en-US" smtClean="0"/>
-              <a:t>10/6/2016</a:t>
+              <a:t>10/18/2016</a:t>
             </a:fld>
             <a:endParaRPr lang="en-US"/>
           </a:p>
@@ -949,7 +950,7 @@
           <a:p>
             <a:fld id="{4C9CA330-40D8-4D0D-94EB-671FCF1C0FE4}" type="datetimeFigureOut">
               <a:rPr lang="en-US" smtClean="0"/>
-              <a:t>10/6/2016</a:t>
+              <a:t>10/18/2016</a:t>
             </a:fld>
             <a:endParaRPr lang="en-US"/>
           </a:p>
@@ -1119,7 +1120,7 @@
           <a:p>
             <a:fld id="{4C9CA330-40D8-4D0D-94EB-671FCF1C0FE4}" type="datetimeFigureOut">
               <a:rPr lang="en-US" smtClean="0"/>
-              <a:t>10/6/2016</a:t>
+              <a:t>10/18/2016</a:t>
             </a:fld>
             <a:endParaRPr lang="en-US"/>
           </a:p>
@@ -1365,7 +1366,7 @@
           <a:p>
             <a:fld id="{4C9CA330-40D8-4D0D-94EB-671FCF1C0FE4}" type="datetimeFigureOut">
               <a:rPr lang="en-US" smtClean="0"/>
-              <a:t>10/6/2016</a:t>
+              <a:t>10/18/2016</a:t>
             </a:fld>
             <a:endParaRPr lang="en-US"/>
           </a:p>
@@ -1597,7 +1598,7 @@
           <a:p>
             <a:fld id="{4C9CA330-40D8-4D0D-94EB-671FCF1C0FE4}" type="datetimeFigureOut">
               <a:rPr lang="en-US" smtClean="0"/>
-              <a:t>10/6/2016</a:t>
+              <a:t>10/18/2016</a:t>
             </a:fld>
             <a:endParaRPr lang="en-US"/>
           </a:p>
@@ -1964,7 +1965,7 @@
           <a:p>
             <a:fld id="{4C9CA330-40D8-4D0D-94EB-671FCF1C0FE4}" type="datetimeFigureOut">
               <a:rPr lang="en-US" smtClean="0"/>
-              <a:t>10/6/2016</a:t>
+              <a:t>10/18/2016</a:t>
             </a:fld>
             <a:endParaRPr lang="en-US"/>
           </a:p>
@@ -2082,7 +2083,7 @@
           <a:p>
             <a:fld id="{4C9CA330-40D8-4D0D-94EB-671FCF1C0FE4}" type="datetimeFigureOut">
               <a:rPr lang="en-US" smtClean="0"/>
-              <a:t>10/6/2016</a:t>
+              <a:t>10/18/2016</a:t>
             </a:fld>
             <a:endParaRPr lang="en-US"/>
           </a:p>
@@ -2177,7 +2178,7 @@
           <a:p>
             <a:fld id="{4C9CA330-40D8-4D0D-94EB-671FCF1C0FE4}" type="datetimeFigureOut">
               <a:rPr lang="en-US" smtClean="0"/>
-              <a:t>10/6/2016</a:t>
+              <a:t>10/18/2016</a:t>
             </a:fld>
             <a:endParaRPr lang="en-US"/>
           </a:p>
@@ -2454,7 +2455,7 @@
           <a:p>
             <a:fld id="{4C9CA330-40D8-4D0D-94EB-671FCF1C0FE4}" type="datetimeFigureOut">
               <a:rPr lang="en-US" smtClean="0"/>
-              <a:t>10/6/2016</a:t>
+              <a:t>10/18/2016</a:t>
             </a:fld>
             <a:endParaRPr lang="en-US"/>
           </a:p>
@@ -2707,7 +2708,7 @@
           <a:p>
             <a:fld id="{4C9CA330-40D8-4D0D-94EB-671FCF1C0FE4}" type="datetimeFigureOut">
               <a:rPr lang="en-US" smtClean="0"/>
-              <a:t>10/6/2016</a:t>
+              <a:t>10/18/2016</a:t>
             </a:fld>
             <a:endParaRPr lang="en-US"/>
           </a:p>
@@ -2920,7 +2921,7 @@
           <a:p>
             <a:fld id="{4C9CA330-40D8-4D0D-94EB-671FCF1C0FE4}" type="datetimeFigureOut">
               <a:rPr lang="en-US" smtClean="0"/>
-              <a:t>10/6/2016</a:t>
+              <a:t>10/18/2016</a:t>
             </a:fld>
             <a:endParaRPr lang="en-US"/>
           </a:p>
@@ -4308,7 +4309,7 @@
           <a:graphicData uri="http://schemas.openxmlformats.org/presentationml/2006/ole">
             <mc:AlternateContent xmlns:mc="http://schemas.openxmlformats.org/markup-compatibility/2006">
               <mc:Choice xmlns:v="urn:schemas-microsoft-com:vml" Requires="v">
-                <p:oleObj spid="_x0000_s1031" name="Equation" r:id="rId3" imgW="1854000" imgH="469800" progId="Equation.3">
+                <p:oleObj spid="_x0000_s1032" name="Equation" r:id="rId3" imgW="1854000" imgH="469800" progId="Equation.3">
                   <p:embed/>
                 </p:oleObj>
               </mc:Choice>
@@ -4492,7 +4493,7 @@
           <a:graphicData uri="http://schemas.openxmlformats.org/presentationml/2006/ole">
             <mc:AlternateContent xmlns:mc="http://schemas.openxmlformats.org/markup-compatibility/2006">
               <mc:Choice xmlns:v="urn:schemas-microsoft-com:vml" Requires="v">
-                <p:oleObj spid="_x0000_s2066" name="Equation" r:id="rId3" imgW="1498320" imgH="444240" progId="Equation.3">
+                <p:oleObj spid="_x0000_s2070" name="Equation" r:id="rId3" imgW="1498320" imgH="444240" progId="Equation.3">
                   <p:embed/>
                 </p:oleObj>
               </mc:Choice>
@@ -4571,7 +4572,7 @@
           <a:graphicData uri="http://schemas.openxmlformats.org/presentationml/2006/ole">
             <mc:AlternateContent xmlns:mc="http://schemas.openxmlformats.org/markup-compatibility/2006">
               <mc:Choice xmlns:v="urn:schemas-microsoft-com:vml" Requires="v">
-                <p:oleObj spid="_x0000_s2067" name="Equation" r:id="rId5" imgW="1701720" imgH="393480" progId="Equation.3">
+                <p:oleObj spid="_x0000_s2071" name="Equation" r:id="rId5" imgW="1701720" imgH="393480" progId="Equation.3">
                   <p:embed/>
                 </p:oleObj>
               </mc:Choice>
@@ -4650,7 +4651,7 @@
           <a:graphicData uri="http://schemas.openxmlformats.org/presentationml/2006/ole">
             <mc:AlternateContent xmlns:mc="http://schemas.openxmlformats.org/markup-compatibility/2006">
               <mc:Choice xmlns:v="urn:schemas-microsoft-com:vml" Requires="v">
-                <p:oleObj spid="_x0000_s2068" name="Equation" r:id="rId7" imgW="1079280" imgH="228600" progId="Equation.3">
+                <p:oleObj spid="_x0000_s2072" name="Equation" r:id="rId7" imgW="1079280" imgH="228600" progId="Equation.3">
                   <p:embed/>
                 </p:oleObj>
               </mc:Choice>
@@ -4873,7 +4874,7 @@
           <a:graphicData uri="http://schemas.openxmlformats.org/presentationml/2006/ole">
             <mc:AlternateContent xmlns:mc="http://schemas.openxmlformats.org/markup-compatibility/2006">
               <mc:Choice xmlns:v="urn:schemas-microsoft-com:vml" Requires="v">
-                <p:oleObj spid="_x0000_s2069" name="Equation" r:id="rId9" imgW="838080" imgH="228600" progId="Equation.3">
+                <p:oleObj spid="_x0000_s2073" name="Equation" r:id="rId9" imgW="838080" imgH="228600" progId="Equation.3">
                   <p:embed/>
                 </p:oleObj>
               </mc:Choice>
@@ -5313,18 +5314,7 @@
                 <a:ea typeface="Times New Roman" panose="02020603050405020304" pitchFamily="18" charset="0"/>
                 <a:cs typeface="Times New Roman" panose="02020603050405020304" pitchFamily="18" charset="0"/>
               </a:rPr>
-              <a:t>p</a:t>
-            </a:r>
-            <a:r>
-              <a:rPr lang="en-US" smtClean="0">
-                <a:solidFill>
-                  <a:srgbClr val="000000"/>
-                </a:solidFill>
-                <a:latin typeface="Arial" panose="020B0604020202020204" pitchFamily="34" charset="0"/>
-                <a:ea typeface="Times New Roman" panose="02020603050405020304" pitchFamily="18" charset="0"/>
-                <a:cs typeface="Times New Roman" panose="02020603050405020304" pitchFamily="18" charset="0"/>
-              </a:rPr>
-              <a:t>83</a:t>
+              <a:t>p83</a:t>
             </a:r>
             <a:endParaRPr lang="en-US" dirty="0" smtClean="0">
               <a:solidFill>
@@ -5593,6 +5583,536 @@
   <p:clrMapOvr>
     <a:masterClrMapping/>
   </p:clrMapOvr>
+</p:sld>
+</file>
+
+<file path=ppt/slides/slide5.xml><?xml version="1.0" encoding="utf-8"?>
+<p:sld xmlns:a="http://schemas.openxmlformats.org/drawingml/2006/main" xmlns:r="http://schemas.openxmlformats.org/officeDocument/2006/relationships" xmlns:p="http://schemas.openxmlformats.org/presentationml/2006/main">
+  <p:cSld>
+    <p:spTree>
+      <p:nvGrpSpPr>
+        <p:cNvPr id="1" name=""/>
+        <p:cNvGrpSpPr/>
+        <p:nvPr/>
+      </p:nvGrpSpPr>
+      <p:grpSpPr>
+        <a:xfrm>
+          <a:off x="0" y="0"/>
+          <a:ext cx="0" cy="0"/>
+          <a:chOff x="0" y="0"/>
+          <a:chExt cx="0" cy="0"/>
+        </a:xfrm>
+      </p:grpSpPr>
+      <p:sp>
+        <p:nvSpPr>
+          <p:cNvPr id="2" name="TextBox 1"/>
+          <p:cNvSpPr txBox="1"/>
+          <p:nvPr/>
+        </p:nvSpPr>
+        <p:spPr>
+          <a:xfrm>
+            <a:off x="1661714" y="609601"/>
+            <a:ext cx="8930086" cy="461665"/>
+          </a:xfrm>
+          <a:prstGeom prst="rect">
+            <a:avLst/>
+          </a:prstGeom>
+          <a:noFill/>
+        </p:spPr>
+        <p:txBody>
+          <a:bodyPr wrap="square" rtlCol="0">
+            <a:spAutoFit/>
+          </a:bodyPr>
+          <a:lstStyle/>
+          <a:p>
+            <a:r>
+              <a:rPr lang="en-US" sz="2400" dirty="0"/>
+              <a:t>Assignment </a:t>
+            </a:r>
+            <a:r>
+              <a:rPr lang="en-US" sz="2400" dirty="0" smtClean="0"/>
+              <a:t>6: </a:t>
+            </a:r>
+            <a:r>
+              <a:rPr lang="en-US" sz="2400" dirty="0"/>
+              <a:t>Due </a:t>
+            </a:r>
+            <a:r>
+              <a:rPr lang="en-US" sz="2400" dirty="0" smtClean="0"/>
+              <a:t>10-20-16</a:t>
+            </a:r>
+            <a:endParaRPr lang="en-US" sz="2400" dirty="0"/>
+          </a:p>
+        </p:txBody>
+      </p:sp>
+      <p:sp>
+        <p:nvSpPr>
+          <p:cNvPr id="3" name="Rectangle 2"/>
+          <p:cNvSpPr/>
+          <p:nvPr/>
+        </p:nvSpPr>
+        <p:spPr>
+          <a:xfrm>
+            <a:off x="689783" y="1063375"/>
+            <a:ext cx="10873947" cy="3352328"/>
+          </a:xfrm>
+          <a:prstGeom prst="rect">
+            <a:avLst/>
+          </a:prstGeom>
+        </p:spPr>
+        <p:txBody>
+          <a:bodyPr wrap="square">
+            <a:spAutoFit/>
+          </a:bodyPr>
+          <a:lstStyle/>
+          <a:p>
+            <a:pPr marL="342900" marR="0" lvl="0" indent="-342900">
+              <a:lnSpc>
+                <a:spcPct val="107000"/>
+              </a:lnSpc>
+              <a:spcBef>
+                <a:spcPts val="0"/>
+              </a:spcBef>
+              <a:spcAft>
+                <a:spcPts val="0"/>
+              </a:spcAft>
+              <a:buFont typeface="+mj-lt"/>
+              <a:buAutoNum type="arabicPeriod"/>
+            </a:pPr>
+            <a:r>
+              <a:rPr lang="en-US" dirty="0">
+                <a:latin typeface="Calibri" panose="020F0502020204030204" pitchFamily="34" charset="0"/>
+                <a:ea typeface="Calibri" panose="020F0502020204030204" pitchFamily="34" charset="0"/>
+                <a:cs typeface="Times New Roman" panose="02020603050405020304" pitchFamily="18" charset="0"/>
+              </a:rPr>
+              <a:t>Start WEKA 3.8 and start the </a:t>
+            </a:r>
+            <a:r>
+              <a:rPr lang="en-US" dirty="0" smtClean="0">
+                <a:latin typeface="Calibri" panose="020F0502020204030204" pitchFamily="34" charset="0"/>
+                <a:ea typeface="Calibri" panose="020F0502020204030204" pitchFamily="34" charset="0"/>
+                <a:cs typeface="Times New Roman" panose="02020603050405020304" pitchFamily="18" charset="0"/>
+              </a:rPr>
+              <a:t>“Explorer </a:t>
+            </a:r>
+            <a:r>
+              <a:rPr lang="en-US" dirty="0">
+                <a:latin typeface="Calibri" panose="020F0502020204030204" pitchFamily="34" charset="0"/>
+                <a:ea typeface="Calibri" panose="020F0502020204030204" pitchFamily="34" charset="0"/>
+                <a:cs typeface="Times New Roman" panose="02020603050405020304" pitchFamily="18" charset="0"/>
+              </a:rPr>
+              <a:t>window”</a:t>
+            </a:r>
+          </a:p>
+          <a:p>
+            <a:pPr marL="342900" marR="0" lvl="0" indent="-342900">
+              <a:lnSpc>
+                <a:spcPct val="107000"/>
+              </a:lnSpc>
+              <a:spcBef>
+                <a:spcPts val="0"/>
+              </a:spcBef>
+              <a:spcAft>
+                <a:spcPts val="0"/>
+              </a:spcAft>
+              <a:buFont typeface="+mj-lt"/>
+              <a:buAutoNum type="arabicPeriod"/>
+            </a:pPr>
+            <a:r>
+              <a:rPr lang="en-US" dirty="0">
+                <a:latin typeface="Calibri" panose="020F0502020204030204" pitchFamily="34" charset="0"/>
+                <a:ea typeface="Calibri" panose="020F0502020204030204" pitchFamily="34" charset="0"/>
+                <a:cs typeface="Times New Roman" panose="02020603050405020304" pitchFamily="18" charset="0"/>
+              </a:rPr>
+              <a:t>On the Preprocess tab, open the “logit-data.csv” file</a:t>
+            </a:r>
+          </a:p>
+          <a:p>
+            <a:pPr marL="342900" marR="0" lvl="0" indent="-342900">
+              <a:lnSpc>
+                <a:spcPct val="107000"/>
+              </a:lnSpc>
+              <a:spcBef>
+                <a:spcPts val="0"/>
+              </a:spcBef>
+              <a:spcAft>
+                <a:spcPts val="0"/>
+              </a:spcAft>
+              <a:buFont typeface="+mj-lt"/>
+              <a:buAutoNum type="arabicPeriod"/>
+            </a:pPr>
+            <a:r>
+              <a:rPr lang="en-US" dirty="0">
+                <a:latin typeface="Calibri" panose="020F0502020204030204" pitchFamily="34" charset="0"/>
+                <a:ea typeface="Calibri" panose="020F0502020204030204" pitchFamily="34" charset="0"/>
+                <a:cs typeface="Times New Roman" panose="02020603050405020304" pitchFamily="18" charset="0"/>
+              </a:rPr>
+              <a:t>Filter the data by clicking on “Choose” button -&gt; filters -&gt; unsupervised -&gt; attribute -&gt; </a:t>
+            </a:r>
+            <a:r>
+              <a:rPr lang="en-US" dirty="0" err="1">
+                <a:latin typeface="Calibri" panose="020F0502020204030204" pitchFamily="34" charset="0"/>
+                <a:ea typeface="Calibri" panose="020F0502020204030204" pitchFamily="34" charset="0"/>
+                <a:cs typeface="Times New Roman" panose="02020603050405020304" pitchFamily="18" charset="0"/>
+              </a:rPr>
+              <a:t>NumericToNominal</a:t>
+            </a:r>
+            <a:r>
+              <a:rPr lang="en-US" dirty="0">
+                <a:latin typeface="Calibri" panose="020F0502020204030204" pitchFamily="34" charset="0"/>
+                <a:ea typeface="Calibri" panose="020F0502020204030204" pitchFamily="34" charset="0"/>
+                <a:cs typeface="Times New Roman" panose="02020603050405020304" pitchFamily="18" charset="0"/>
+              </a:rPr>
+              <a:t>, then click “</a:t>
+            </a:r>
+            <a:r>
+              <a:rPr lang="en-US" dirty="0" smtClean="0">
+                <a:latin typeface="Calibri" panose="020F0502020204030204" pitchFamily="34" charset="0"/>
+                <a:ea typeface="Calibri" panose="020F0502020204030204" pitchFamily="34" charset="0"/>
+                <a:cs typeface="Times New Roman" panose="02020603050405020304" pitchFamily="18" charset="0"/>
+              </a:rPr>
+              <a:t>Apply” to generate a .</a:t>
+            </a:r>
+            <a:r>
+              <a:rPr lang="en-US" dirty="0" err="1" smtClean="0">
+                <a:latin typeface="Calibri" panose="020F0502020204030204" pitchFamily="34" charset="0"/>
+                <a:ea typeface="Calibri" panose="020F0502020204030204" pitchFamily="34" charset="0"/>
+                <a:cs typeface="Times New Roman" panose="02020603050405020304" pitchFamily="18" charset="0"/>
+              </a:rPr>
+              <a:t>arff</a:t>
+            </a:r>
+            <a:r>
+              <a:rPr lang="en-US" dirty="0" smtClean="0">
+                <a:latin typeface="Calibri" panose="020F0502020204030204" pitchFamily="34" charset="0"/>
+                <a:ea typeface="Calibri" panose="020F0502020204030204" pitchFamily="34" charset="0"/>
+                <a:cs typeface="Times New Roman" panose="02020603050405020304" pitchFamily="18" charset="0"/>
+              </a:rPr>
+              <a:t> </a:t>
+            </a:r>
+          </a:p>
+          <a:p>
+            <a:pPr marL="342900" marR="0" lvl="0" indent="-342900">
+              <a:lnSpc>
+                <a:spcPct val="107000"/>
+              </a:lnSpc>
+              <a:spcBef>
+                <a:spcPts val="0"/>
+              </a:spcBef>
+              <a:spcAft>
+                <a:spcPts val="0"/>
+              </a:spcAft>
+              <a:buFont typeface="+mj-lt"/>
+              <a:buAutoNum type="arabicPeriod"/>
+            </a:pPr>
+            <a:r>
+              <a:rPr lang="en-US" dirty="0" smtClean="0">
+                <a:latin typeface="Calibri" panose="020F0502020204030204" pitchFamily="34" charset="0"/>
+                <a:ea typeface="Calibri" panose="020F0502020204030204" pitchFamily="34" charset="0"/>
+                <a:cs typeface="Times New Roman" panose="02020603050405020304" pitchFamily="18" charset="0"/>
+              </a:rPr>
+              <a:t>Go </a:t>
+            </a:r>
+            <a:r>
+              <a:rPr lang="en-US" dirty="0">
+                <a:latin typeface="Calibri" panose="020F0502020204030204" pitchFamily="34" charset="0"/>
+                <a:ea typeface="Calibri" panose="020F0502020204030204" pitchFamily="34" charset="0"/>
+                <a:cs typeface="Times New Roman" panose="02020603050405020304" pitchFamily="18" charset="0"/>
+              </a:rPr>
+              <a:t>to the “Classify” tab and click the “Choose” </a:t>
+            </a:r>
+            <a:r>
+              <a:rPr lang="en-US" dirty="0" smtClean="0">
+                <a:latin typeface="Calibri" panose="020F0502020204030204" pitchFamily="34" charset="0"/>
+                <a:ea typeface="Calibri" panose="020F0502020204030204" pitchFamily="34" charset="0"/>
+                <a:cs typeface="Times New Roman" panose="02020603050405020304" pitchFamily="18" charset="0"/>
+              </a:rPr>
+              <a:t>button. </a:t>
+            </a:r>
+            <a:r>
+              <a:rPr lang="en-US" dirty="0">
+                <a:latin typeface="Calibri" panose="020F0502020204030204" pitchFamily="34" charset="0"/>
+                <a:ea typeface="Calibri" panose="020F0502020204030204" pitchFamily="34" charset="0"/>
+                <a:cs typeface="Times New Roman" panose="02020603050405020304" pitchFamily="18" charset="0"/>
+              </a:rPr>
+              <a:t> </a:t>
+            </a:r>
+            <a:r>
+              <a:rPr lang="en-US" dirty="0" smtClean="0">
+                <a:latin typeface="Calibri" panose="020F0502020204030204" pitchFamily="34" charset="0"/>
+                <a:ea typeface="Calibri" panose="020F0502020204030204" pitchFamily="34" charset="0"/>
+                <a:cs typeface="Times New Roman" panose="02020603050405020304" pitchFamily="18" charset="0"/>
+              </a:rPr>
+              <a:t>Choose “</a:t>
+            </a:r>
+            <a:r>
+              <a:rPr lang="en-US" dirty="0" err="1">
+                <a:latin typeface="Calibri" panose="020F0502020204030204" pitchFamily="34" charset="0"/>
+                <a:ea typeface="Calibri" panose="020F0502020204030204" pitchFamily="34" charset="0"/>
+                <a:cs typeface="Times New Roman" panose="02020603050405020304" pitchFamily="18" charset="0"/>
+              </a:rPr>
+              <a:t>SimpleLogistic</a:t>
+            </a:r>
+            <a:r>
+              <a:rPr lang="en-US" dirty="0">
+                <a:latin typeface="Calibri" panose="020F0502020204030204" pitchFamily="34" charset="0"/>
+                <a:ea typeface="Calibri" panose="020F0502020204030204" pitchFamily="34" charset="0"/>
+                <a:cs typeface="Times New Roman" panose="02020603050405020304" pitchFamily="18" charset="0"/>
+              </a:rPr>
+              <a:t>” classifiers under “functions”.</a:t>
+            </a:r>
+          </a:p>
+          <a:p>
+            <a:pPr marL="342900" marR="0" lvl="0" indent="-342900">
+              <a:lnSpc>
+                <a:spcPct val="107000"/>
+              </a:lnSpc>
+              <a:spcBef>
+                <a:spcPts val="0"/>
+              </a:spcBef>
+              <a:spcAft>
+                <a:spcPts val="0"/>
+              </a:spcAft>
+              <a:buFont typeface="+mj-lt"/>
+              <a:buAutoNum type="arabicPeriod"/>
+            </a:pPr>
+            <a:r>
+              <a:rPr lang="en-US" dirty="0" smtClean="0">
+                <a:latin typeface="Calibri" panose="020F0502020204030204" pitchFamily="34" charset="0"/>
+                <a:ea typeface="Calibri" panose="020F0502020204030204" pitchFamily="34" charset="0"/>
+                <a:cs typeface="Times New Roman" panose="02020603050405020304" pitchFamily="18" charset="0"/>
+              </a:rPr>
+              <a:t>Run with </a:t>
+            </a:r>
+            <a:r>
+              <a:rPr lang="en-US" dirty="0">
+                <a:latin typeface="Calibri" panose="020F0502020204030204" pitchFamily="34" charset="0"/>
+                <a:ea typeface="Calibri" panose="020F0502020204030204" pitchFamily="34" charset="0"/>
+                <a:cs typeface="Times New Roman" panose="02020603050405020304" pitchFamily="18" charset="0"/>
+              </a:rPr>
+              <a:t>default settings </a:t>
+            </a:r>
+            <a:r>
+              <a:rPr lang="en-US" dirty="0" smtClean="0">
+                <a:latin typeface="Calibri" panose="020F0502020204030204" pitchFamily="34" charset="0"/>
+                <a:ea typeface="Calibri" panose="020F0502020204030204" pitchFamily="34" charset="0"/>
+                <a:cs typeface="Times New Roman" panose="02020603050405020304" pitchFamily="18" charset="0"/>
+              </a:rPr>
+              <a:t>and </a:t>
+            </a:r>
+            <a:r>
+              <a:rPr lang="en-US" dirty="0">
+                <a:latin typeface="Calibri" panose="020F0502020204030204" pitchFamily="34" charset="0"/>
+                <a:ea typeface="Calibri" panose="020F0502020204030204" pitchFamily="34" charset="0"/>
+                <a:cs typeface="Times New Roman" panose="02020603050405020304" pitchFamily="18" charset="0"/>
+              </a:rPr>
+              <a:t>10-fold </a:t>
+            </a:r>
+            <a:r>
+              <a:rPr lang="en-US" dirty="0" smtClean="0">
+                <a:latin typeface="Calibri" panose="020F0502020204030204" pitchFamily="34" charset="0"/>
+                <a:ea typeface="Calibri" panose="020F0502020204030204" pitchFamily="34" charset="0"/>
+                <a:cs typeface="Times New Roman" panose="02020603050405020304" pitchFamily="18" charset="0"/>
+              </a:rPr>
+              <a:t>cross-validation.</a:t>
+            </a:r>
+            <a:endParaRPr lang="en-US" dirty="0">
+              <a:latin typeface="Calibri" panose="020F0502020204030204" pitchFamily="34" charset="0"/>
+              <a:ea typeface="Calibri" panose="020F0502020204030204" pitchFamily="34" charset="0"/>
+              <a:cs typeface="Times New Roman" panose="02020603050405020304" pitchFamily="18" charset="0"/>
+            </a:endParaRPr>
+          </a:p>
+          <a:p>
+            <a:pPr marL="342900" marR="0" lvl="0" indent="-342900">
+              <a:lnSpc>
+                <a:spcPct val="107000"/>
+              </a:lnSpc>
+              <a:spcBef>
+                <a:spcPts val="0"/>
+              </a:spcBef>
+              <a:spcAft>
+                <a:spcPts val="0"/>
+              </a:spcAft>
+              <a:buFont typeface="+mj-lt"/>
+              <a:buAutoNum type="arabicPeriod"/>
+            </a:pPr>
+            <a:r>
+              <a:rPr lang="en-US" dirty="0" smtClean="0">
+                <a:latin typeface="Calibri" panose="020F0502020204030204" pitchFamily="34" charset="0"/>
+                <a:ea typeface="Calibri" panose="020F0502020204030204" pitchFamily="34" charset="0"/>
+                <a:cs typeface="Times New Roman" panose="02020603050405020304" pitchFamily="18" charset="0"/>
+              </a:rPr>
+              <a:t>Include the results </a:t>
+            </a:r>
+            <a:r>
+              <a:rPr lang="en-US" dirty="0">
+                <a:latin typeface="Calibri" panose="020F0502020204030204" pitchFamily="34" charset="0"/>
+                <a:ea typeface="Calibri" panose="020F0502020204030204" pitchFamily="34" charset="0"/>
+                <a:cs typeface="Times New Roman" panose="02020603050405020304" pitchFamily="18" charset="0"/>
+              </a:rPr>
+              <a:t>summary and confusion </a:t>
+            </a:r>
+            <a:r>
+              <a:rPr lang="en-US" dirty="0" smtClean="0">
+                <a:latin typeface="Calibri" panose="020F0502020204030204" pitchFamily="34" charset="0"/>
+                <a:ea typeface="Calibri" panose="020F0502020204030204" pitchFamily="34" charset="0"/>
+                <a:cs typeface="Times New Roman" panose="02020603050405020304" pitchFamily="18" charset="0"/>
+              </a:rPr>
+              <a:t>matrix in your report</a:t>
+            </a:r>
+            <a:endParaRPr lang="en-US" dirty="0">
+              <a:latin typeface="Calibri" panose="020F0502020204030204" pitchFamily="34" charset="0"/>
+              <a:ea typeface="Calibri" panose="020F0502020204030204" pitchFamily="34" charset="0"/>
+              <a:cs typeface="Times New Roman" panose="02020603050405020304" pitchFamily="18" charset="0"/>
+            </a:endParaRPr>
+          </a:p>
+          <a:p>
+            <a:pPr marL="342900" marR="0" lvl="0" indent="-342900">
+              <a:lnSpc>
+                <a:spcPct val="107000"/>
+              </a:lnSpc>
+              <a:spcBef>
+                <a:spcPts val="0"/>
+              </a:spcBef>
+              <a:spcAft>
+                <a:spcPts val="0"/>
+              </a:spcAft>
+              <a:buFont typeface="+mj-lt"/>
+              <a:buAutoNum type="arabicPeriod"/>
+            </a:pPr>
+            <a:r>
+              <a:rPr lang="en-US" dirty="0">
+                <a:latin typeface="Calibri" panose="020F0502020204030204" pitchFamily="34" charset="0"/>
+                <a:ea typeface="Calibri" panose="020F0502020204030204" pitchFamily="34" charset="0"/>
+                <a:cs typeface="Times New Roman" panose="02020603050405020304" pitchFamily="18" charset="0"/>
+              </a:rPr>
+              <a:t>Right-click in the result list </a:t>
+            </a:r>
+            <a:r>
+              <a:rPr lang="en-US" dirty="0" smtClean="0">
+                <a:latin typeface="Calibri" panose="020F0502020204030204" pitchFamily="34" charset="0"/>
+                <a:ea typeface="Calibri" panose="020F0502020204030204" pitchFamily="34" charset="0"/>
+                <a:cs typeface="Times New Roman" panose="02020603050405020304" pitchFamily="18" charset="0"/>
+              </a:rPr>
+              <a:t>to open visualization options.  Include class-specific ROC curves in your report.</a:t>
+            </a:r>
+            <a:endParaRPr lang="en-US" dirty="0">
+              <a:latin typeface="Calibri" panose="020F0502020204030204" pitchFamily="34" charset="0"/>
+              <a:ea typeface="Calibri" panose="020F0502020204030204" pitchFamily="34" charset="0"/>
+              <a:cs typeface="Times New Roman" panose="02020603050405020304" pitchFamily="18" charset="0"/>
+            </a:endParaRPr>
+          </a:p>
+          <a:p>
+            <a:pPr marL="342900" marR="0" lvl="0" indent="-342900">
+              <a:lnSpc>
+                <a:spcPct val="107000"/>
+              </a:lnSpc>
+              <a:spcBef>
+                <a:spcPts val="0"/>
+              </a:spcBef>
+              <a:spcAft>
+                <a:spcPts val="0"/>
+              </a:spcAft>
+              <a:buFont typeface="+mj-lt"/>
+              <a:buAutoNum type="arabicPeriod"/>
+            </a:pPr>
+            <a:r>
+              <a:rPr lang="en-US" dirty="0" smtClean="0">
+                <a:latin typeface="Calibri" panose="020F0502020204030204" pitchFamily="34" charset="0"/>
+                <a:ea typeface="Calibri" panose="020F0502020204030204" pitchFamily="34" charset="0"/>
+                <a:cs typeface="Times New Roman" panose="02020603050405020304" pitchFamily="18" charset="0"/>
+              </a:rPr>
+              <a:t>Return </a:t>
+            </a:r>
+            <a:r>
+              <a:rPr lang="en-US" dirty="0">
+                <a:latin typeface="Calibri" panose="020F0502020204030204" pitchFamily="34" charset="0"/>
+                <a:ea typeface="Calibri" panose="020F0502020204030204" pitchFamily="34" charset="0"/>
+                <a:cs typeface="Times New Roman" panose="02020603050405020304" pitchFamily="18" charset="0"/>
+              </a:rPr>
+              <a:t>to the “Classify” tab </a:t>
+            </a:r>
+            <a:r>
+              <a:rPr lang="en-US" dirty="0" smtClean="0">
+                <a:latin typeface="Calibri" panose="020F0502020204030204" pitchFamily="34" charset="0"/>
+                <a:ea typeface="Calibri" panose="020F0502020204030204" pitchFamily="34" charset="0"/>
+                <a:cs typeface="Times New Roman" panose="02020603050405020304" pitchFamily="18" charset="0"/>
+              </a:rPr>
+              <a:t>and “Logistic” </a:t>
+            </a:r>
+            <a:r>
+              <a:rPr lang="en-US" dirty="0">
+                <a:latin typeface="Calibri" panose="020F0502020204030204" pitchFamily="34" charset="0"/>
+                <a:ea typeface="Calibri" panose="020F0502020204030204" pitchFamily="34" charset="0"/>
+                <a:cs typeface="Times New Roman" panose="02020603050405020304" pitchFamily="18" charset="0"/>
+              </a:rPr>
+              <a:t>classifiers under “functions”.</a:t>
+            </a:r>
+          </a:p>
+          <a:p>
+            <a:pPr marL="342900" marR="0" lvl="0" indent="-342900">
+              <a:lnSpc>
+                <a:spcPct val="107000"/>
+              </a:lnSpc>
+              <a:spcBef>
+                <a:spcPts val="0"/>
+              </a:spcBef>
+              <a:spcAft>
+                <a:spcPts val="0"/>
+              </a:spcAft>
+              <a:buFont typeface="+mj-lt"/>
+              <a:buAutoNum type="arabicPeriod"/>
+            </a:pPr>
+            <a:r>
+              <a:rPr lang="en-US" dirty="0">
+                <a:latin typeface="Calibri" panose="020F0502020204030204" pitchFamily="34" charset="0"/>
+                <a:ea typeface="Calibri" panose="020F0502020204030204" pitchFamily="34" charset="0"/>
+                <a:cs typeface="Times New Roman" panose="02020603050405020304" pitchFamily="18" charset="0"/>
+              </a:rPr>
+              <a:t>Run with default settings and 10-fold cross-validation.</a:t>
+            </a:r>
+          </a:p>
+          <a:p>
+            <a:pPr marL="342900" marR="0" lvl="0" indent="-342900">
+              <a:lnSpc>
+                <a:spcPct val="107000"/>
+              </a:lnSpc>
+              <a:spcBef>
+                <a:spcPts val="0"/>
+              </a:spcBef>
+              <a:spcAft>
+                <a:spcPts val="0"/>
+              </a:spcAft>
+              <a:buFont typeface="+mj-lt"/>
+              <a:buAutoNum type="arabicPeriod"/>
+            </a:pPr>
+            <a:r>
+              <a:rPr lang="en-US" dirty="0">
+                <a:latin typeface="Calibri" panose="020F0502020204030204" pitchFamily="34" charset="0"/>
+                <a:ea typeface="Calibri" panose="020F0502020204030204" pitchFamily="34" charset="0"/>
+                <a:cs typeface="Times New Roman" panose="02020603050405020304" pitchFamily="18" charset="0"/>
+              </a:rPr>
+              <a:t>Include the results summary and confusion matrix in your report</a:t>
+            </a:r>
+          </a:p>
+        </p:txBody>
+      </p:sp>
+    </p:spTree>
+    <p:extLst>
+      <p:ext uri="{BB962C8B-B14F-4D97-AF65-F5344CB8AC3E}">
+        <p14:creationId xmlns:p14="http://schemas.microsoft.com/office/powerpoint/2010/main" val="3050996387"/>
+      </p:ext>
+    </p:extLst>
+  </p:cSld>
+  <p:clrMapOvr>
+    <a:masterClrMapping/>
+  </p:clrMapOvr>
+  <p:timing>
+    <p:tnLst>
+      <p:par>
+        <p:cTn id="1" dur="indefinite" restart="never" nodeType="tmRoot"/>
+      </p:par>
+    </p:tnLst>
+  </p:timing>
 </p:sld>
 </file>
 

</xml_diff>